<commit_message>
new qrcode for play.kort.ch
</commit_message>
<xml_diff>
--- a/_DOCUMENTATION/05_Poster/kort-Poster.pptx
+++ b/_DOCUMENTATION/05_Poster/kort-Poster.pptx
@@ -5333,7 +5333,29 @@
                 </a:solidFill>
                 <a:latin typeface="Calibri" pitchFamily="34" charset="0"/>
               </a:rPr>
-              <a:t>http://kort.herokuapp.com</a:t>
+              <a:t>http</a:t>
+            </a:r>
+            <a:r>
+              <a:rPr lang="de-CH" sz="5000" b="1" u="sng" dirty="0" smtClean="0">
+                <a:solidFill>
+                  <a:schemeClr val="bg2">
+                    <a:lumMod val="50000"/>
+                  </a:schemeClr>
+                </a:solidFill>
+                <a:latin typeface="Calibri" pitchFamily="34" charset="0"/>
+              </a:rPr>
+              <a:t>://</a:t>
+            </a:r>
+            <a:r>
+              <a:rPr lang="de-CH" sz="5000" b="1" u="sng" dirty="0" smtClean="0">
+                <a:solidFill>
+                  <a:schemeClr val="bg2">
+                    <a:lumMod val="50000"/>
+                  </a:schemeClr>
+                </a:solidFill>
+                <a:latin typeface="Calibri" pitchFamily="34" charset="0"/>
+              </a:rPr>
+              <a:t>play.kort.ch</a:t>
             </a:r>
             <a:endParaRPr lang="de-CH" sz="5000" b="1" u="sng" dirty="0">
               <a:solidFill>
@@ -5346,47 +5368,6 @@
           </a:p>
         </p:txBody>
       </p:sp>
-      <p:pic>
-        <p:nvPicPr>
-          <p:cNvPr id="8" name="Picture 2" descr="D:\xampp\htdocs\kort\_DOCUMENTATION\05_Poster\images\kort.herokuapp.com_qrcode.png"/>
-          <p:cNvPicPr>
-            <a:picLocks noChangeAspect="1" noChangeArrowheads="1"/>
-          </p:cNvPicPr>
-          <p:nvPr/>
-        </p:nvPicPr>
-        <p:blipFill>
-          <a:blip r:embed="rId5" cstate="print">
-            <a:extLst>
-              <a:ext uri="{28A0092B-C50C-407E-A947-70E740481C1C}">
-                <a14:useLocalDpi xmlns:a14="http://schemas.microsoft.com/office/drawing/2010/main" val="0"/>
-              </a:ext>
-            </a:extLst>
-          </a:blip>
-          <a:srcRect/>
-          <a:stretch>
-            <a:fillRect/>
-          </a:stretch>
-        </p:blipFill>
-        <p:spPr bwMode="auto">
-          <a:xfrm>
-            <a:off x="38832506" y="25924496"/>
-            <a:ext cx="2393321" cy="2393321"/>
-          </a:xfrm>
-          <a:prstGeom prst="rect">
-            <a:avLst/>
-          </a:prstGeom>
-          <a:noFill/>
-          <a:extLst>
-            <a:ext uri="{909E8E84-426E-40DD-AFC4-6F175D3DCCD1}">
-              <a14:hiddenFill xmlns:a14="http://schemas.microsoft.com/office/drawing/2010/main">
-                <a:solidFill>
-                  <a:srgbClr val="FFFFFF"/>
-                </a:solidFill>
-              </a14:hiddenFill>
-            </a:ext>
-          </a:extLst>
-        </p:spPr>
-      </p:pic>
       <p:pic>
         <p:nvPicPr>
           <p:cNvPr id="1034" name="Picture 10" descr="D:\xampp\htdocs\kort\_DOCUMENTATION\02_Documentation\images\screenshots\kort-screenshot-vote.png"/>
@@ -5396,7 +5377,7 @@
           <p:nvPr/>
         </p:nvPicPr>
         <p:blipFill>
-          <a:blip r:embed="rId6">
+          <a:blip r:embed="rId5">
             <a:extLst>
               <a:ext uri="{28A0092B-C50C-407E-A947-70E740481C1C}">
                 <a14:useLocalDpi xmlns:a14="http://schemas.microsoft.com/office/drawing/2010/main" val="0"/>
@@ -5437,7 +5418,7 @@
           <p:nvPr/>
         </p:nvPicPr>
         <p:blipFill>
-          <a:blip r:embed="rId7">
+          <a:blip r:embed="rId6">
             <a:extLst>
               <a:ext uri="{28A0092B-C50C-407E-A947-70E740481C1C}">
                 <a14:useLocalDpi xmlns:a14="http://schemas.microsoft.com/office/drawing/2010/main" val="0"/>
@@ -5478,7 +5459,7 @@
           <p:nvPr/>
         </p:nvPicPr>
         <p:blipFill>
-          <a:blip r:embed="rId8">
+          <a:blip r:embed="rId7">
             <a:extLst>
               <a:ext uri="{28A0092B-C50C-407E-A947-70E740481C1C}">
                 <a14:useLocalDpi xmlns:a14="http://schemas.microsoft.com/office/drawing/2010/main" val="0"/>
@@ -6491,7 +6472,7 @@
           <p:nvPr/>
         </p:nvPicPr>
         <p:blipFill>
-          <a:blip r:embed="rId9">
+          <a:blip r:embed="rId8">
             <a:extLst>
               <a:ext uri="{28A0092B-C50C-407E-A947-70E740481C1C}">
                 <a14:useLocalDpi xmlns:a14="http://schemas.microsoft.com/office/drawing/2010/main" val="0"/>
@@ -6532,7 +6513,7 @@
           <p:nvPr/>
         </p:nvPicPr>
         <p:blipFill rotWithShape="1">
-          <a:blip r:embed="rId10">
+          <a:blip r:embed="rId9">
             <a:extLst>
               <a:ext uri="{28A0092B-C50C-407E-A947-70E740481C1C}">
                 <a14:useLocalDpi xmlns:a14="http://schemas.microsoft.com/office/drawing/2010/main" val="0"/>
@@ -6571,7 +6552,7 @@
           <p:nvPr/>
         </p:nvPicPr>
         <p:blipFill>
-          <a:blip r:embed="rId11">
+          <a:blip r:embed="rId10">
             <a:extLst>
               <a:ext uri="{28A0092B-C50C-407E-A947-70E740481C1C}">
                 <a14:useLocalDpi xmlns:a14="http://schemas.microsoft.com/office/drawing/2010/main" val="0"/>
@@ -6612,7 +6593,7 @@
           <p:nvPr/>
         </p:nvPicPr>
         <p:blipFill>
-          <a:blip r:embed="rId12">
+          <a:blip r:embed="rId11">
             <a:extLst>
               <a:ext uri="{28A0092B-C50C-407E-A947-70E740481C1C}">
                 <a14:useLocalDpi xmlns:a14="http://schemas.microsoft.com/office/drawing/2010/main" val="0"/>
@@ -6676,7 +6657,7 @@
           <p:nvPr/>
         </p:nvPicPr>
         <p:blipFill>
-          <a:blip r:embed="rId13">
+          <a:blip r:embed="rId12">
             <a:extLst>
               <a:ext uri="{28A0092B-C50C-407E-A947-70E740481C1C}">
                 <a14:useLocalDpi xmlns:a14="http://schemas.microsoft.com/office/drawing/2010/main" val="0"/>
@@ -6740,7 +6721,7 @@
           <p:nvPr/>
         </p:nvPicPr>
         <p:blipFill>
-          <a:blip r:embed="rId14">
+          <a:blip r:embed="rId13">
             <a:extLst>
               <a:ext uri="{28A0092B-C50C-407E-A947-70E740481C1C}">
                 <a14:useLocalDpi xmlns:a14="http://schemas.microsoft.com/office/drawing/2010/main" val="0"/>
@@ -6804,7 +6785,7 @@
           <p:nvPr/>
         </p:nvPicPr>
         <p:blipFill>
-          <a:blip r:embed="rId15">
+          <a:blip r:embed="rId14">
             <a:extLst>
               <a:ext uri="{28A0092B-C50C-407E-A947-70E740481C1C}">
                 <a14:useLocalDpi xmlns:a14="http://schemas.microsoft.com/office/drawing/2010/main" val="0"/>
@@ -6868,7 +6849,7 @@
           <p:nvPr/>
         </p:nvPicPr>
         <p:blipFill>
-          <a:blip r:embed="rId16" cstate="print">
+          <a:blip r:embed="rId15" cstate="print">
             <a:extLst>
               <a:ext uri="{28A0092B-C50C-407E-A947-70E740481C1C}">
                 <a14:useLocalDpi xmlns:a14="http://schemas.microsoft.com/office/drawing/2010/main" val="0"/>
@@ -6909,7 +6890,7 @@
           <p:nvPr/>
         </p:nvPicPr>
         <p:blipFill>
-          <a:blip r:embed="rId17">
+          <a:blip r:embed="rId16">
             <a:extLst>
               <a:ext uri="{28A0092B-C50C-407E-A947-70E740481C1C}">
                 <a14:useLocalDpi xmlns:a14="http://schemas.microsoft.com/office/drawing/2010/main" val="0"/>
@@ -7150,7 +7131,7 @@
           <p:nvPr/>
         </p:nvPicPr>
         <p:blipFill>
-          <a:blip r:embed="rId18">
+          <a:blip r:embed="rId17">
             <a:extLst>
               <a:ext uri="{28A0092B-C50C-407E-A947-70E740481C1C}">
                 <a14:useLocalDpi xmlns:a14="http://schemas.microsoft.com/office/drawing/2010/main" val="0"/>
@@ -7256,7 +7237,7 @@
           <p:nvPr/>
         </p:nvPicPr>
         <p:blipFill>
-          <a:blip r:embed="rId19">
+          <a:blip r:embed="rId18">
             <a:extLst>
               <a:ext uri="{28A0092B-C50C-407E-A947-70E740481C1C}">
                 <a14:useLocalDpi xmlns:a14="http://schemas.microsoft.com/office/drawing/2010/main" val="0"/>
@@ -7297,7 +7278,7 @@
           <p:nvPr/>
         </p:nvPicPr>
         <p:blipFill>
-          <a:blip r:embed="rId20" cstate="print">
+          <a:blip r:embed="rId19" cstate="print">
             <a:extLst>
               <a:ext uri="{28A0092B-C50C-407E-A947-70E740481C1C}">
                 <a14:useLocalDpi xmlns:a14="http://schemas.microsoft.com/office/drawing/2010/main" val="0"/>
@@ -7338,7 +7319,7 @@
           <p:nvPr/>
         </p:nvPicPr>
         <p:blipFill>
-          <a:blip r:embed="rId21" cstate="print">
+          <a:blip r:embed="rId20" cstate="print">
             <a:extLst>
               <a:ext uri="{28A0092B-C50C-407E-A947-70E740481C1C}">
                 <a14:useLocalDpi xmlns:a14="http://schemas.microsoft.com/office/drawing/2010/main" val="0"/>
@@ -7379,7 +7360,7 @@
           <p:nvPr/>
         </p:nvPicPr>
         <p:blipFill>
-          <a:blip r:embed="rId22">
+          <a:blip r:embed="rId21">
             <a:extLst>
               <a:ext uri="{28A0092B-C50C-407E-A947-70E740481C1C}">
                 <a14:useLocalDpi xmlns:a14="http://schemas.microsoft.com/office/drawing/2010/main" val="0"/>
@@ -7395,6 +7376,47 @@
           <a:xfrm>
             <a:off x="16309952" y="13987827"/>
             <a:ext cx="12871390" cy="14760877"/>
+          </a:xfrm>
+          <a:prstGeom prst="rect">
+            <a:avLst/>
+          </a:prstGeom>
+          <a:noFill/>
+          <a:extLst>
+            <a:ext uri="{909E8E84-426E-40DD-AFC4-6F175D3DCCD1}">
+              <a14:hiddenFill xmlns:a14="http://schemas.microsoft.com/office/drawing/2010/main">
+                <a:solidFill>
+                  <a:srgbClr val="FFFFFF"/>
+                </a:solidFill>
+              </a14:hiddenFill>
+            </a:ext>
+          </a:extLst>
+        </p:spPr>
+      </p:pic>
+      <p:pic>
+        <p:nvPicPr>
+          <p:cNvPr id="10" name="Picture 2" descr="D:\xampp\htdocs\kort-docu\_DOCUMENTATION\05_Poster\images\play.kort.ch_qrcode.png"/>
+          <p:cNvPicPr>
+            <a:picLocks noChangeAspect="1" noChangeArrowheads="1"/>
+          </p:cNvPicPr>
+          <p:nvPr/>
+        </p:nvPicPr>
+        <p:blipFill>
+          <a:blip r:embed="rId22">
+            <a:extLst>
+              <a:ext uri="{28A0092B-C50C-407E-A947-70E740481C1C}">
+                <a14:useLocalDpi xmlns:a14="http://schemas.microsoft.com/office/drawing/2010/main" val="0"/>
+              </a:ext>
+            </a:extLst>
+          </a:blip>
+          <a:srcRect/>
+          <a:stretch>
+            <a:fillRect/>
+          </a:stretch>
+        </p:blipFill>
+        <p:spPr bwMode="auto">
+          <a:xfrm>
+            <a:off x="38830047" y="25919577"/>
+            <a:ext cx="2398240" cy="2398240"/>
           </a:xfrm>
           <a:prstGeom prst="rect">
             <a:avLst/>

</xml_diff>